<commit_message>
beta values updated for SBS
</commit_message>
<xml_diff>
--- a/Reports/Final.pptx
+++ b/Reports/Final.pptx
@@ -5141,42 +5141,42 @@
                 <a:gridCol w="1074501">
                   <a:extLst>
                     <a:ext uri="{9D8B030D-6E8A-4147-A177-3AD203B41FA5}">
-                      <a16:colId xmlns:a16="http://schemas.microsoft.com/office/drawing/2014/main" xmlns="" val="20000"/>
+                      <a16:colId xmlns="" xmlns:a16="http://schemas.microsoft.com/office/drawing/2014/main" val="20000"/>
                     </a:ext>
                   </a:extLst>
                 </a:gridCol>
                 <a:gridCol w="1094563">
                   <a:extLst>
                     <a:ext uri="{9D8B030D-6E8A-4147-A177-3AD203B41FA5}">
-                      <a16:colId xmlns:a16="http://schemas.microsoft.com/office/drawing/2014/main" xmlns="" val="20001"/>
+                      <a16:colId xmlns="" xmlns:a16="http://schemas.microsoft.com/office/drawing/2014/main" val="20001"/>
                     </a:ext>
                   </a:extLst>
                 </a:gridCol>
                 <a:gridCol w="1112808">
                   <a:extLst>
                     <a:ext uri="{9D8B030D-6E8A-4147-A177-3AD203B41FA5}">
-                      <a16:colId xmlns:a16="http://schemas.microsoft.com/office/drawing/2014/main" xmlns="" val="20002"/>
+                      <a16:colId xmlns="" xmlns:a16="http://schemas.microsoft.com/office/drawing/2014/main" val="20002"/>
                     </a:ext>
                   </a:extLst>
                 </a:gridCol>
                 <a:gridCol w="755968">
                   <a:extLst>
                     <a:ext uri="{9D8B030D-6E8A-4147-A177-3AD203B41FA5}">
-                      <a16:colId xmlns:a16="http://schemas.microsoft.com/office/drawing/2014/main" xmlns="" val="20003"/>
+                      <a16:colId xmlns="" xmlns:a16="http://schemas.microsoft.com/office/drawing/2014/main" val="20003"/>
                     </a:ext>
                   </a:extLst>
                 </a:gridCol>
                 <a:gridCol w="909275">
                   <a:extLst>
                     <a:ext uri="{9D8B030D-6E8A-4147-A177-3AD203B41FA5}">
-                      <a16:colId xmlns:a16="http://schemas.microsoft.com/office/drawing/2014/main" xmlns="" val="20004"/>
+                      <a16:colId xmlns="" xmlns:a16="http://schemas.microsoft.com/office/drawing/2014/main" val="20004"/>
                     </a:ext>
                   </a:extLst>
                 </a:gridCol>
                 <a:gridCol w="1226019">
                   <a:extLst>
                     <a:ext uri="{9D8B030D-6E8A-4147-A177-3AD203B41FA5}">
-                      <a16:colId xmlns:a16="http://schemas.microsoft.com/office/drawing/2014/main" xmlns="" val="20005"/>
+                      <a16:colId xmlns="" xmlns:a16="http://schemas.microsoft.com/office/drawing/2014/main" val="20005"/>
                     </a:ext>
                   </a:extLst>
                 </a:gridCol>
@@ -5268,7 +5268,7 @@
                 </a:tc>
                 <a:extLst>
                   <a:ext uri="{0D108BD9-81ED-4DB2-BD59-A6C34878D82A}">
-                    <a16:rowId xmlns:a16="http://schemas.microsoft.com/office/drawing/2014/main" xmlns="" val="10000"/>
+                    <a16:rowId xmlns="" xmlns:a16="http://schemas.microsoft.com/office/drawing/2014/main" val="10000"/>
                   </a:ext>
                 </a:extLst>
               </a:tr>
@@ -5367,7 +5367,7 @@
                 </a:tc>
                 <a:extLst>
                   <a:ext uri="{0D108BD9-81ED-4DB2-BD59-A6C34878D82A}">
-                    <a16:rowId xmlns:a16="http://schemas.microsoft.com/office/drawing/2014/main" xmlns="" val="10001"/>
+                    <a16:rowId xmlns="" xmlns:a16="http://schemas.microsoft.com/office/drawing/2014/main" val="10001"/>
                   </a:ext>
                 </a:extLst>
               </a:tr>
@@ -5525,7 +5525,7 @@
                 </a:tc>
                 <a:extLst>
                   <a:ext uri="{0D108BD9-81ED-4DB2-BD59-A6C34878D82A}">
-                    <a16:rowId xmlns:a16="http://schemas.microsoft.com/office/drawing/2014/main" xmlns="" val="10002"/>
+                    <a16:rowId xmlns="" xmlns:a16="http://schemas.microsoft.com/office/drawing/2014/main" val="10002"/>
                   </a:ext>
                 </a:extLst>
               </a:tr>
@@ -5685,7 +5685,7 @@
                 </a:tc>
                 <a:extLst>
                   <a:ext uri="{0D108BD9-81ED-4DB2-BD59-A6C34878D82A}">
-                    <a16:rowId xmlns:a16="http://schemas.microsoft.com/office/drawing/2014/main" xmlns="" val="10003"/>
+                    <a16:rowId xmlns="" xmlns:a16="http://schemas.microsoft.com/office/drawing/2014/main" val="10003"/>
                   </a:ext>
                 </a:extLst>
               </a:tr>
@@ -5826,7 +5826,7 @@
                 </a:tc>
                 <a:extLst>
                   <a:ext uri="{0D108BD9-81ED-4DB2-BD59-A6C34878D82A}">
-                    <a16:rowId xmlns:a16="http://schemas.microsoft.com/office/drawing/2014/main" xmlns="" val="10004"/>
+                    <a16:rowId xmlns="" xmlns:a16="http://schemas.microsoft.com/office/drawing/2014/main" val="10004"/>
                   </a:ext>
                 </a:extLst>
               </a:tr>
@@ -6043,42 +6043,42 @@
                 <a:gridCol w="1074501">
                   <a:extLst>
                     <a:ext uri="{9D8B030D-6E8A-4147-A177-3AD203B41FA5}">
-                      <a16:colId xmlns:a16="http://schemas.microsoft.com/office/drawing/2014/main" xmlns="" val="20000"/>
+                      <a16:colId xmlns="" xmlns:a16="http://schemas.microsoft.com/office/drawing/2014/main" val="20000"/>
                     </a:ext>
                   </a:extLst>
                 </a:gridCol>
                 <a:gridCol w="1051431">
                   <a:extLst>
                     <a:ext uri="{9D8B030D-6E8A-4147-A177-3AD203B41FA5}">
-                      <a16:colId xmlns:a16="http://schemas.microsoft.com/office/drawing/2014/main" xmlns="" val="20001"/>
+                      <a16:colId xmlns="" xmlns:a16="http://schemas.microsoft.com/office/drawing/2014/main" val="20001"/>
                     </a:ext>
                   </a:extLst>
                 </a:gridCol>
                 <a:gridCol w="1104181">
                   <a:extLst>
                     <a:ext uri="{9D8B030D-6E8A-4147-A177-3AD203B41FA5}">
-                      <a16:colId xmlns:a16="http://schemas.microsoft.com/office/drawing/2014/main" xmlns="" val="20002"/>
+                      <a16:colId xmlns="" xmlns:a16="http://schemas.microsoft.com/office/drawing/2014/main" val="20002"/>
                     </a:ext>
                   </a:extLst>
                 </a:gridCol>
                 <a:gridCol w="751557">
                   <a:extLst>
                     <a:ext uri="{9D8B030D-6E8A-4147-A177-3AD203B41FA5}">
-                      <a16:colId xmlns:a16="http://schemas.microsoft.com/office/drawing/2014/main" xmlns="" val="20003"/>
+                      <a16:colId xmlns="" xmlns:a16="http://schemas.microsoft.com/office/drawing/2014/main" val="20003"/>
                     </a:ext>
                   </a:extLst>
                 </a:gridCol>
                 <a:gridCol w="909275">
                   <a:extLst>
                     <a:ext uri="{9D8B030D-6E8A-4147-A177-3AD203B41FA5}">
-                      <a16:colId xmlns:a16="http://schemas.microsoft.com/office/drawing/2014/main" xmlns="" val="20004"/>
+                      <a16:colId xmlns="" xmlns:a16="http://schemas.microsoft.com/office/drawing/2014/main" val="20004"/>
                     </a:ext>
                   </a:extLst>
                 </a:gridCol>
                 <a:gridCol w="1226019">
                   <a:extLst>
                     <a:ext uri="{9D8B030D-6E8A-4147-A177-3AD203B41FA5}">
-                      <a16:colId xmlns:a16="http://schemas.microsoft.com/office/drawing/2014/main" xmlns="" val="20005"/>
+                      <a16:colId xmlns="" xmlns:a16="http://schemas.microsoft.com/office/drawing/2014/main" val="20005"/>
                     </a:ext>
                   </a:extLst>
                 </a:gridCol>
@@ -6170,7 +6170,7 @@
                 </a:tc>
                 <a:extLst>
                   <a:ext uri="{0D108BD9-81ED-4DB2-BD59-A6C34878D82A}">
-                    <a16:rowId xmlns:a16="http://schemas.microsoft.com/office/drawing/2014/main" xmlns="" val="10000"/>
+                    <a16:rowId xmlns="" xmlns:a16="http://schemas.microsoft.com/office/drawing/2014/main" val="10000"/>
                   </a:ext>
                 </a:extLst>
               </a:tr>
@@ -6309,7 +6309,7 @@
                 </a:tc>
                 <a:extLst>
                   <a:ext uri="{0D108BD9-81ED-4DB2-BD59-A6C34878D82A}">
-                    <a16:rowId xmlns:a16="http://schemas.microsoft.com/office/drawing/2014/main" xmlns="" val="10001"/>
+                    <a16:rowId xmlns="" xmlns:a16="http://schemas.microsoft.com/office/drawing/2014/main" val="10001"/>
                   </a:ext>
                 </a:extLst>
               </a:tr>
@@ -6465,7 +6465,7 @@
                 </a:tc>
                 <a:extLst>
                   <a:ext uri="{0D108BD9-81ED-4DB2-BD59-A6C34878D82A}">
-                    <a16:rowId xmlns:a16="http://schemas.microsoft.com/office/drawing/2014/main" xmlns="" val="10002"/>
+                    <a16:rowId xmlns="" xmlns:a16="http://schemas.microsoft.com/office/drawing/2014/main" val="10002"/>
                   </a:ext>
                 </a:extLst>
               </a:tr>
@@ -6604,7 +6604,7 @@
                 </a:tc>
                 <a:extLst>
                   <a:ext uri="{0D108BD9-81ED-4DB2-BD59-A6C34878D82A}">
-                    <a16:rowId xmlns:a16="http://schemas.microsoft.com/office/drawing/2014/main" xmlns="" val="10003"/>
+                    <a16:rowId xmlns="" xmlns:a16="http://schemas.microsoft.com/office/drawing/2014/main" val="10003"/>
                   </a:ext>
                 </a:extLst>
               </a:tr>
@@ -6760,7 +6760,7 @@
                 </a:tc>
                 <a:extLst>
                   <a:ext uri="{0D108BD9-81ED-4DB2-BD59-A6C34878D82A}">
-                    <a16:rowId xmlns:a16="http://schemas.microsoft.com/office/drawing/2014/main" xmlns="" val="10004"/>
+                    <a16:rowId xmlns="" xmlns:a16="http://schemas.microsoft.com/office/drawing/2014/main" val="10004"/>
                   </a:ext>
                 </a:extLst>
               </a:tr>
@@ -8523,42 +8523,42 @@
                 <a:gridCol w="1074501">
                   <a:extLst>
                     <a:ext uri="{9D8B030D-6E8A-4147-A177-3AD203B41FA5}">
-                      <a16:colId xmlns:a16="http://schemas.microsoft.com/office/drawing/2014/main" xmlns="" val="20000"/>
+                      <a16:colId xmlns="" xmlns:a16="http://schemas.microsoft.com/office/drawing/2014/main" val="20000"/>
                     </a:ext>
                   </a:extLst>
                 </a:gridCol>
                 <a:gridCol w="1094563">
                   <a:extLst>
                     <a:ext uri="{9D8B030D-6E8A-4147-A177-3AD203B41FA5}">
-                      <a16:colId xmlns:a16="http://schemas.microsoft.com/office/drawing/2014/main" xmlns="" val="20001"/>
+                      <a16:colId xmlns="" xmlns:a16="http://schemas.microsoft.com/office/drawing/2014/main" val="20001"/>
                     </a:ext>
                   </a:extLst>
                 </a:gridCol>
                 <a:gridCol w="1112808">
                   <a:extLst>
                     <a:ext uri="{9D8B030D-6E8A-4147-A177-3AD203B41FA5}">
-                      <a16:colId xmlns:a16="http://schemas.microsoft.com/office/drawing/2014/main" xmlns="" val="20002"/>
+                      <a16:colId xmlns="" xmlns:a16="http://schemas.microsoft.com/office/drawing/2014/main" val="20002"/>
                     </a:ext>
                   </a:extLst>
                 </a:gridCol>
                 <a:gridCol w="755968">
                   <a:extLst>
                     <a:ext uri="{9D8B030D-6E8A-4147-A177-3AD203B41FA5}">
-                      <a16:colId xmlns:a16="http://schemas.microsoft.com/office/drawing/2014/main" xmlns="" val="20003"/>
+                      <a16:colId xmlns="" xmlns:a16="http://schemas.microsoft.com/office/drawing/2014/main" val="20003"/>
                     </a:ext>
                   </a:extLst>
                 </a:gridCol>
                 <a:gridCol w="909275">
                   <a:extLst>
                     <a:ext uri="{9D8B030D-6E8A-4147-A177-3AD203B41FA5}">
-                      <a16:colId xmlns:a16="http://schemas.microsoft.com/office/drawing/2014/main" xmlns="" val="20004"/>
+                      <a16:colId xmlns="" xmlns:a16="http://schemas.microsoft.com/office/drawing/2014/main" val="20004"/>
                     </a:ext>
                   </a:extLst>
                 </a:gridCol>
                 <a:gridCol w="1226019">
                   <a:extLst>
                     <a:ext uri="{9D8B030D-6E8A-4147-A177-3AD203B41FA5}">
-                      <a16:colId xmlns:a16="http://schemas.microsoft.com/office/drawing/2014/main" xmlns="" val="20005"/>
+                      <a16:colId xmlns="" xmlns:a16="http://schemas.microsoft.com/office/drawing/2014/main" val="20005"/>
                     </a:ext>
                   </a:extLst>
                 </a:gridCol>
@@ -8650,7 +8650,7 @@
                 </a:tc>
                 <a:extLst>
                   <a:ext uri="{0D108BD9-81ED-4DB2-BD59-A6C34878D82A}">
-                    <a16:rowId xmlns:a16="http://schemas.microsoft.com/office/drawing/2014/main" xmlns="" val="10000"/>
+                    <a16:rowId xmlns="" xmlns:a16="http://schemas.microsoft.com/office/drawing/2014/main" val="10000"/>
                   </a:ext>
                 </a:extLst>
               </a:tr>
@@ -8749,7 +8749,7 @@
                 </a:tc>
                 <a:extLst>
                   <a:ext uri="{0D108BD9-81ED-4DB2-BD59-A6C34878D82A}">
-                    <a16:rowId xmlns:a16="http://schemas.microsoft.com/office/drawing/2014/main" xmlns="" val="10001"/>
+                    <a16:rowId xmlns="" xmlns:a16="http://schemas.microsoft.com/office/drawing/2014/main" val="10001"/>
                   </a:ext>
                 </a:extLst>
               </a:tr>
@@ -8867,7 +8867,7 @@
                 </a:tc>
                 <a:extLst>
                   <a:ext uri="{0D108BD9-81ED-4DB2-BD59-A6C34878D82A}">
-                    <a16:rowId xmlns:a16="http://schemas.microsoft.com/office/drawing/2014/main" xmlns="" val="10002"/>
+                    <a16:rowId xmlns="" xmlns:a16="http://schemas.microsoft.com/office/drawing/2014/main" val="10002"/>
                   </a:ext>
                 </a:extLst>
               </a:tr>
@@ -9008,7 +9008,7 @@
                 </a:tc>
                 <a:extLst>
                   <a:ext uri="{0D108BD9-81ED-4DB2-BD59-A6C34878D82A}">
-                    <a16:rowId xmlns:a16="http://schemas.microsoft.com/office/drawing/2014/main" xmlns="" val="10003"/>
+                    <a16:rowId xmlns="" xmlns:a16="http://schemas.microsoft.com/office/drawing/2014/main" val="10003"/>
                   </a:ext>
                 </a:extLst>
               </a:tr>
@@ -9151,7 +9151,7 @@
                 </a:tc>
                 <a:extLst>
                   <a:ext uri="{0D108BD9-81ED-4DB2-BD59-A6C34878D82A}">
-                    <a16:rowId xmlns:a16="http://schemas.microsoft.com/office/drawing/2014/main" xmlns="" val="10004"/>
+                    <a16:rowId xmlns="" xmlns:a16="http://schemas.microsoft.com/office/drawing/2014/main" val="10004"/>
                   </a:ext>
                 </a:extLst>
               </a:tr>
@@ -9242,42 +9242,42 @@
                 <a:gridCol w="1074501">
                   <a:extLst>
                     <a:ext uri="{9D8B030D-6E8A-4147-A177-3AD203B41FA5}">
-                      <a16:colId xmlns:a16="http://schemas.microsoft.com/office/drawing/2014/main" xmlns="" val="20000"/>
+                      <a16:colId xmlns="" xmlns:a16="http://schemas.microsoft.com/office/drawing/2014/main" val="20000"/>
                     </a:ext>
                   </a:extLst>
                 </a:gridCol>
                 <a:gridCol w="1051431">
                   <a:extLst>
                     <a:ext uri="{9D8B030D-6E8A-4147-A177-3AD203B41FA5}">
-                      <a16:colId xmlns:a16="http://schemas.microsoft.com/office/drawing/2014/main" xmlns="" val="20001"/>
+                      <a16:colId xmlns="" xmlns:a16="http://schemas.microsoft.com/office/drawing/2014/main" val="20001"/>
                     </a:ext>
                   </a:extLst>
                 </a:gridCol>
                 <a:gridCol w="1104181">
                   <a:extLst>
                     <a:ext uri="{9D8B030D-6E8A-4147-A177-3AD203B41FA5}">
-                      <a16:colId xmlns:a16="http://schemas.microsoft.com/office/drawing/2014/main" xmlns="" val="20002"/>
+                      <a16:colId xmlns="" xmlns:a16="http://schemas.microsoft.com/office/drawing/2014/main" val="20002"/>
                     </a:ext>
                   </a:extLst>
                 </a:gridCol>
                 <a:gridCol w="751557">
                   <a:extLst>
                     <a:ext uri="{9D8B030D-6E8A-4147-A177-3AD203B41FA5}">
-                      <a16:colId xmlns:a16="http://schemas.microsoft.com/office/drawing/2014/main" xmlns="" val="20003"/>
+                      <a16:colId xmlns="" xmlns:a16="http://schemas.microsoft.com/office/drawing/2014/main" val="20003"/>
                     </a:ext>
                   </a:extLst>
                 </a:gridCol>
                 <a:gridCol w="909275">
                   <a:extLst>
                     <a:ext uri="{9D8B030D-6E8A-4147-A177-3AD203B41FA5}">
-                      <a16:colId xmlns:a16="http://schemas.microsoft.com/office/drawing/2014/main" xmlns="" val="20004"/>
+                      <a16:colId xmlns="" xmlns:a16="http://schemas.microsoft.com/office/drawing/2014/main" val="20004"/>
                     </a:ext>
                   </a:extLst>
                 </a:gridCol>
                 <a:gridCol w="1226019">
                   <a:extLst>
                     <a:ext uri="{9D8B030D-6E8A-4147-A177-3AD203B41FA5}">
-                      <a16:colId xmlns:a16="http://schemas.microsoft.com/office/drawing/2014/main" xmlns="" val="20005"/>
+                      <a16:colId xmlns="" xmlns:a16="http://schemas.microsoft.com/office/drawing/2014/main" val="20005"/>
                     </a:ext>
                   </a:extLst>
                 </a:gridCol>
@@ -9369,7 +9369,7 @@
                 </a:tc>
                 <a:extLst>
                   <a:ext uri="{0D108BD9-81ED-4DB2-BD59-A6C34878D82A}">
-                    <a16:rowId xmlns:a16="http://schemas.microsoft.com/office/drawing/2014/main" xmlns="" val="10000"/>
+                    <a16:rowId xmlns="" xmlns:a16="http://schemas.microsoft.com/office/drawing/2014/main" val="10000"/>
                   </a:ext>
                 </a:extLst>
               </a:tr>
@@ -9508,7 +9508,7 @@
                 </a:tc>
                 <a:extLst>
                   <a:ext uri="{0D108BD9-81ED-4DB2-BD59-A6C34878D82A}">
-                    <a16:rowId xmlns:a16="http://schemas.microsoft.com/office/drawing/2014/main" xmlns="" val="10001"/>
+                    <a16:rowId xmlns="" xmlns:a16="http://schemas.microsoft.com/office/drawing/2014/main" val="10001"/>
                   </a:ext>
                 </a:extLst>
               </a:tr>
@@ -9664,7 +9664,7 @@
                 </a:tc>
                 <a:extLst>
                   <a:ext uri="{0D108BD9-81ED-4DB2-BD59-A6C34878D82A}">
-                    <a16:rowId xmlns:a16="http://schemas.microsoft.com/office/drawing/2014/main" xmlns="" val="10002"/>
+                    <a16:rowId xmlns="" xmlns:a16="http://schemas.microsoft.com/office/drawing/2014/main" val="10002"/>
                   </a:ext>
                 </a:extLst>
               </a:tr>
@@ -9803,7 +9803,7 @@
                 </a:tc>
                 <a:extLst>
                   <a:ext uri="{0D108BD9-81ED-4DB2-BD59-A6C34878D82A}">
-                    <a16:rowId xmlns:a16="http://schemas.microsoft.com/office/drawing/2014/main" xmlns="" val="10003"/>
+                    <a16:rowId xmlns="" xmlns:a16="http://schemas.microsoft.com/office/drawing/2014/main" val="10003"/>
                   </a:ext>
                 </a:extLst>
               </a:tr>
@@ -9942,7 +9942,7 @@
                 </a:tc>
                 <a:extLst>
                   <a:ext uri="{0D108BD9-81ED-4DB2-BD59-A6C34878D82A}">
-                    <a16:rowId xmlns:a16="http://schemas.microsoft.com/office/drawing/2014/main" xmlns="" val="10004"/>
+                    <a16:rowId xmlns="" xmlns:a16="http://schemas.microsoft.com/office/drawing/2014/main" val="10004"/>
                   </a:ext>
                 </a:extLst>
               </a:tr>
@@ -11449,28 +11449,28 @@
                 <a:gridCol w="2628900">
                   <a:extLst>
                     <a:ext uri="{9D8B030D-6E8A-4147-A177-3AD203B41FA5}">
-                      <a16:colId xmlns:a16="http://schemas.microsoft.com/office/drawing/2014/main" xmlns="" val="20000"/>
+                      <a16:colId xmlns="" xmlns:a16="http://schemas.microsoft.com/office/drawing/2014/main" val="20000"/>
                     </a:ext>
                   </a:extLst>
                 </a:gridCol>
                 <a:gridCol w="2628900">
                   <a:extLst>
                     <a:ext uri="{9D8B030D-6E8A-4147-A177-3AD203B41FA5}">
-                      <a16:colId xmlns:a16="http://schemas.microsoft.com/office/drawing/2014/main" xmlns="" val="20001"/>
+                      <a16:colId xmlns="" xmlns:a16="http://schemas.microsoft.com/office/drawing/2014/main" val="20001"/>
                     </a:ext>
                   </a:extLst>
                 </a:gridCol>
                 <a:gridCol w="2628900">
                   <a:extLst>
                     <a:ext uri="{9D8B030D-6E8A-4147-A177-3AD203B41FA5}">
-                      <a16:colId xmlns:a16="http://schemas.microsoft.com/office/drawing/2014/main" xmlns="" val="20002"/>
+                      <a16:colId xmlns="" xmlns:a16="http://schemas.microsoft.com/office/drawing/2014/main" val="20002"/>
                     </a:ext>
                   </a:extLst>
                 </a:gridCol>
                 <a:gridCol w="2628900">
                   <a:extLst>
                     <a:ext uri="{9D8B030D-6E8A-4147-A177-3AD203B41FA5}">
-                      <a16:colId xmlns:a16="http://schemas.microsoft.com/office/drawing/2014/main" xmlns="" val="20003"/>
+                      <a16:colId xmlns="" xmlns:a16="http://schemas.microsoft.com/office/drawing/2014/main" val="20003"/>
                     </a:ext>
                   </a:extLst>
                 </a:gridCol>
@@ -11534,7 +11534,7 @@
                 </a:tc>
                 <a:extLst>
                   <a:ext uri="{0D108BD9-81ED-4DB2-BD59-A6C34878D82A}">
-                    <a16:rowId xmlns:a16="http://schemas.microsoft.com/office/drawing/2014/main" xmlns="" val="10000"/>
+                    <a16:rowId xmlns="" xmlns:a16="http://schemas.microsoft.com/office/drawing/2014/main" val="10000"/>
                   </a:ext>
                 </a:extLst>
               </a:tr>
@@ -11597,7 +11597,7 @@
                 </a:tc>
                 <a:extLst>
                   <a:ext uri="{0D108BD9-81ED-4DB2-BD59-A6C34878D82A}">
-                    <a16:rowId xmlns:a16="http://schemas.microsoft.com/office/drawing/2014/main" xmlns="" val="10001"/>
+                    <a16:rowId xmlns="" xmlns:a16="http://schemas.microsoft.com/office/drawing/2014/main" val="10001"/>
                   </a:ext>
                 </a:extLst>
               </a:tr>
@@ -11690,7 +11690,7 @@
                 </a:tc>
                 <a:extLst>
                   <a:ext uri="{0D108BD9-81ED-4DB2-BD59-A6C34878D82A}">
-                    <a16:rowId xmlns:a16="http://schemas.microsoft.com/office/drawing/2014/main" xmlns="" val="10002"/>
+                    <a16:rowId xmlns="" xmlns:a16="http://schemas.microsoft.com/office/drawing/2014/main" val="10002"/>
                   </a:ext>
                 </a:extLst>
               </a:tr>
@@ -11779,7 +11779,7 @@
                 </a:tc>
                 <a:extLst>
                   <a:ext uri="{0D108BD9-81ED-4DB2-BD59-A6C34878D82A}">
-                    <a16:rowId xmlns:a16="http://schemas.microsoft.com/office/drawing/2014/main" xmlns="" val="10003"/>
+                    <a16:rowId xmlns="" xmlns:a16="http://schemas.microsoft.com/office/drawing/2014/main" val="10003"/>
                   </a:ext>
                 </a:extLst>
               </a:tr>
@@ -11907,42 +11907,42 @@
                 <a:gridCol w="1074501">
                   <a:extLst>
                     <a:ext uri="{9D8B030D-6E8A-4147-A177-3AD203B41FA5}">
-                      <a16:colId xmlns:a16="http://schemas.microsoft.com/office/drawing/2014/main" xmlns="" val="20000"/>
+                      <a16:colId xmlns="" xmlns:a16="http://schemas.microsoft.com/office/drawing/2014/main" val="20000"/>
                     </a:ext>
                   </a:extLst>
                 </a:gridCol>
                 <a:gridCol w="1094563">
                   <a:extLst>
                     <a:ext uri="{9D8B030D-6E8A-4147-A177-3AD203B41FA5}">
-                      <a16:colId xmlns:a16="http://schemas.microsoft.com/office/drawing/2014/main" xmlns="" val="20001"/>
+                      <a16:colId xmlns="" xmlns:a16="http://schemas.microsoft.com/office/drawing/2014/main" val="20001"/>
                     </a:ext>
                   </a:extLst>
                 </a:gridCol>
                 <a:gridCol w="1112808">
                   <a:extLst>
                     <a:ext uri="{9D8B030D-6E8A-4147-A177-3AD203B41FA5}">
-                      <a16:colId xmlns:a16="http://schemas.microsoft.com/office/drawing/2014/main" xmlns="" val="20002"/>
+                      <a16:colId xmlns="" xmlns:a16="http://schemas.microsoft.com/office/drawing/2014/main" val="20002"/>
                     </a:ext>
                   </a:extLst>
                 </a:gridCol>
                 <a:gridCol w="755968">
                   <a:extLst>
                     <a:ext uri="{9D8B030D-6E8A-4147-A177-3AD203B41FA5}">
-                      <a16:colId xmlns:a16="http://schemas.microsoft.com/office/drawing/2014/main" xmlns="" val="20003"/>
+                      <a16:colId xmlns="" xmlns:a16="http://schemas.microsoft.com/office/drawing/2014/main" val="20003"/>
                     </a:ext>
                   </a:extLst>
                 </a:gridCol>
                 <a:gridCol w="909275">
                   <a:extLst>
                     <a:ext uri="{9D8B030D-6E8A-4147-A177-3AD203B41FA5}">
-                      <a16:colId xmlns:a16="http://schemas.microsoft.com/office/drawing/2014/main" xmlns="" val="20004"/>
+                      <a16:colId xmlns="" xmlns:a16="http://schemas.microsoft.com/office/drawing/2014/main" val="20004"/>
                     </a:ext>
                   </a:extLst>
                 </a:gridCol>
                 <a:gridCol w="1226019">
                   <a:extLst>
                     <a:ext uri="{9D8B030D-6E8A-4147-A177-3AD203B41FA5}">
-                      <a16:colId xmlns:a16="http://schemas.microsoft.com/office/drawing/2014/main" xmlns="" val="20005"/>
+                      <a16:colId xmlns="" xmlns:a16="http://schemas.microsoft.com/office/drawing/2014/main" val="20005"/>
                     </a:ext>
                   </a:extLst>
                 </a:gridCol>
@@ -12034,7 +12034,7 @@
                 </a:tc>
                 <a:extLst>
                   <a:ext uri="{0D108BD9-81ED-4DB2-BD59-A6C34878D82A}">
-                    <a16:rowId xmlns:a16="http://schemas.microsoft.com/office/drawing/2014/main" xmlns="" val="10000"/>
+                    <a16:rowId xmlns="" xmlns:a16="http://schemas.microsoft.com/office/drawing/2014/main" val="10000"/>
                   </a:ext>
                 </a:extLst>
               </a:tr>
@@ -12133,7 +12133,7 @@
                 </a:tc>
                 <a:extLst>
                   <a:ext uri="{0D108BD9-81ED-4DB2-BD59-A6C34878D82A}">
-                    <a16:rowId xmlns:a16="http://schemas.microsoft.com/office/drawing/2014/main" xmlns="" val="10001"/>
+                    <a16:rowId xmlns="" xmlns:a16="http://schemas.microsoft.com/office/drawing/2014/main" val="10001"/>
                   </a:ext>
                 </a:extLst>
               </a:tr>
@@ -12251,7 +12251,7 @@
                 </a:tc>
                 <a:extLst>
                   <a:ext uri="{0D108BD9-81ED-4DB2-BD59-A6C34878D82A}">
-                    <a16:rowId xmlns:a16="http://schemas.microsoft.com/office/drawing/2014/main" xmlns="" val="10002"/>
+                    <a16:rowId xmlns="" xmlns:a16="http://schemas.microsoft.com/office/drawing/2014/main" val="10002"/>
                   </a:ext>
                 </a:extLst>
               </a:tr>
@@ -12392,7 +12392,7 @@
                 </a:tc>
                 <a:extLst>
                   <a:ext uri="{0D108BD9-81ED-4DB2-BD59-A6C34878D82A}">
-                    <a16:rowId xmlns:a16="http://schemas.microsoft.com/office/drawing/2014/main" xmlns="" val="10003"/>
+                    <a16:rowId xmlns="" xmlns:a16="http://schemas.microsoft.com/office/drawing/2014/main" val="10003"/>
                   </a:ext>
                 </a:extLst>
               </a:tr>
@@ -12533,7 +12533,7 @@
                 </a:tc>
                 <a:extLst>
                   <a:ext uri="{0D108BD9-81ED-4DB2-BD59-A6C34878D82A}">
-                    <a16:rowId xmlns:a16="http://schemas.microsoft.com/office/drawing/2014/main" xmlns="" val="10004"/>
+                    <a16:rowId xmlns="" xmlns:a16="http://schemas.microsoft.com/office/drawing/2014/main" val="10004"/>
                   </a:ext>
                 </a:extLst>
               </a:tr>
@@ -12631,42 +12631,42 @@
                 <a:gridCol w="1074501">
                   <a:extLst>
                     <a:ext uri="{9D8B030D-6E8A-4147-A177-3AD203B41FA5}">
-                      <a16:colId xmlns:a16="http://schemas.microsoft.com/office/drawing/2014/main" xmlns="" val="20000"/>
+                      <a16:colId xmlns="" xmlns:a16="http://schemas.microsoft.com/office/drawing/2014/main" val="20000"/>
                     </a:ext>
                   </a:extLst>
                 </a:gridCol>
                 <a:gridCol w="1051431">
                   <a:extLst>
                     <a:ext uri="{9D8B030D-6E8A-4147-A177-3AD203B41FA5}">
-                      <a16:colId xmlns:a16="http://schemas.microsoft.com/office/drawing/2014/main" xmlns="" val="20001"/>
+                      <a16:colId xmlns="" xmlns:a16="http://schemas.microsoft.com/office/drawing/2014/main" val="20001"/>
                     </a:ext>
                   </a:extLst>
                 </a:gridCol>
                 <a:gridCol w="1104181">
                   <a:extLst>
                     <a:ext uri="{9D8B030D-6E8A-4147-A177-3AD203B41FA5}">
-                      <a16:colId xmlns:a16="http://schemas.microsoft.com/office/drawing/2014/main" xmlns="" val="20002"/>
+                      <a16:colId xmlns="" xmlns:a16="http://schemas.microsoft.com/office/drawing/2014/main" val="20002"/>
                     </a:ext>
                   </a:extLst>
                 </a:gridCol>
                 <a:gridCol w="751557">
                   <a:extLst>
                     <a:ext uri="{9D8B030D-6E8A-4147-A177-3AD203B41FA5}">
-                      <a16:colId xmlns:a16="http://schemas.microsoft.com/office/drawing/2014/main" xmlns="" val="20003"/>
+                      <a16:colId xmlns="" xmlns:a16="http://schemas.microsoft.com/office/drawing/2014/main" val="20003"/>
                     </a:ext>
                   </a:extLst>
                 </a:gridCol>
                 <a:gridCol w="909275">
                   <a:extLst>
                     <a:ext uri="{9D8B030D-6E8A-4147-A177-3AD203B41FA5}">
-                      <a16:colId xmlns:a16="http://schemas.microsoft.com/office/drawing/2014/main" xmlns="" val="20004"/>
+                      <a16:colId xmlns="" xmlns:a16="http://schemas.microsoft.com/office/drawing/2014/main" val="20004"/>
                     </a:ext>
                   </a:extLst>
                 </a:gridCol>
                 <a:gridCol w="1226019">
                   <a:extLst>
                     <a:ext uri="{9D8B030D-6E8A-4147-A177-3AD203B41FA5}">
-                      <a16:colId xmlns:a16="http://schemas.microsoft.com/office/drawing/2014/main" xmlns="" val="20005"/>
+                      <a16:colId xmlns="" xmlns:a16="http://schemas.microsoft.com/office/drawing/2014/main" val="20005"/>
                     </a:ext>
                   </a:extLst>
                 </a:gridCol>
@@ -12758,7 +12758,7 @@
                 </a:tc>
                 <a:extLst>
                   <a:ext uri="{0D108BD9-81ED-4DB2-BD59-A6C34878D82A}">
-                    <a16:rowId xmlns:a16="http://schemas.microsoft.com/office/drawing/2014/main" xmlns="" val="10000"/>
+                    <a16:rowId xmlns="" xmlns:a16="http://schemas.microsoft.com/office/drawing/2014/main" val="10000"/>
                   </a:ext>
                 </a:extLst>
               </a:tr>
@@ -12853,7 +12853,7 @@
                 </a:tc>
                 <a:extLst>
                   <a:ext uri="{0D108BD9-81ED-4DB2-BD59-A6C34878D82A}">
-                    <a16:rowId xmlns:a16="http://schemas.microsoft.com/office/drawing/2014/main" xmlns="" val="10001"/>
+                    <a16:rowId xmlns="" xmlns:a16="http://schemas.microsoft.com/office/drawing/2014/main" val="10001"/>
                   </a:ext>
                 </a:extLst>
               </a:tr>
@@ -13009,7 +13009,7 @@
                 </a:tc>
                 <a:extLst>
                   <a:ext uri="{0D108BD9-81ED-4DB2-BD59-A6C34878D82A}">
-                    <a16:rowId xmlns:a16="http://schemas.microsoft.com/office/drawing/2014/main" xmlns="" val="10002"/>
+                    <a16:rowId xmlns="" xmlns:a16="http://schemas.microsoft.com/office/drawing/2014/main" val="10002"/>
                   </a:ext>
                 </a:extLst>
               </a:tr>
@@ -13165,7 +13165,7 @@
                 </a:tc>
                 <a:extLst>
                   <a:ext uri="{0D108BD9-81ED-4DB2-BD59-A6C34878D82A}">
-                    <a16:rowId xmlns:a16="http://schemas.microsoft.com/office/drawing/2014/main" xmlns="" val="10003"/>
+                    <a16:rowId xmlns="" xmlns:a16="http://schemas.microsoft.com/office/drawing/2014/main" val="10003"/>
                   </a:ext>
                 </a:extLst>
               </a:tr>
@@ -13298,7 +13298,7 @@
                 </a:tc>
                 <a:extLst>
                   <a:ext uri="{0D108BD9-81ED-4DB2-BD59-A6C34878D82A}">
-                    <a16:rowId xmlns:a16="http://schemas.microsoft.com/office/drawing/2014/main" xmlns="" val="10004"/>
+                    <a16:rowId xmlns="" xmlns:a16="http://schemas.microsoft.com/office/drawing/2014/main" val="10004"/>
                   </a:ext>
                 </a:extLst>
               </a:tr>
@@ -14570,7 +14570,12 @@
             <p:ph type="title"/>
           </p:nvPr>
         </p:nvSpPr>
-        <p:spPr/>
+        <p:spPr>
+          <a:xfrm>
+            <a:off x="838200" y="118722"/>
+            <a:ext cx="10515600" cy="1325563"/>
+          </a:xfrm>
+        </p:spPr>
         <p:txBody>
           <a:bodyPr>
             <a:normAutofit/>
@@ -14594,14 +14599,14 @@
           <p:nvPr>
             <p:extLst>
               <p:ext uri="{D42A27DB-BD31-4B8C-83A1-F6EECF244321}">
-                <p14:modId xmlns:p14="http://schemas.microsoft.com/office/powerpoint/2010/main" val="1618985894"/>
+                <p14:modId xmlns:p14="http://schemas.microsoft.com/office/powerpoint/2010/main" val="2339497999"/>
               </p:ext>
             </p:extLst>
           </p:nvPr>
         </p:nvGraphicFramePr>
         <p:xfrm>
-          <a:off x="2032000" y="1444285"/>
-          <a:ext cx="8128000" cy="3683000"/>
+          <a:off x="940279" y="1099229"/>
+          <a:ext cx="10567359" cy="3134360"/>
         </p:xfrm>
         <a:graphic>
           <a:graphicData uri="http://schemas.openxmlformats.org/drawingml/2006/table">
@@ -14610,8 +14615,8 @@
                 <a:tableStyleId>{5C22544A-7EE6-4342-B048-85BDC9FD1C3A}</a:tableStyleId>
               </a:tblPr>
               <a:tblGrid>
-                <a:gridCol w="4064000"/>
-                <a:gridCol w="4064000"/>
+                <a:gridCol w="4532227"/>
+                <a:gridCol w="6035132"/>
               </a:tblGrid>
               <a:tr h="370840">
                 <a:tc>
@@ -14673,11 +14678,7 @@
                       </a:r>
                       <a:r>
                         <a:rPr lang="en-IN" baseline="0" dirty="0" smtClean="0"/>
-                        <a:t> (lower=0; upper=1</a:t>
-                      </a:r>
-                      <a:r>
-                        <a:rPr lang="en-IN" baseline="0" dirty="0" smtClean="0"/>
-                        <a:t>)</a:t>
+                        <a:t> (lower=0; upper=1)</a:t>
                       </a:r>
                     </a:p>
                     <a:p>
@@ -14725,11 +14726,7 @@
                       </a:r>
                       <a:r>
                         <a:rPr lang="en-IN" baseline="0" dirty="0" smtClean="0"/>
-                        <a:t> (lower=0; upper=1</a:t>
-                      </a:r>
-                      <a:r>
-                        <a:rPr lang="en-IN" baseline="0" dirty="0" smtClean="0"/>
-                        <a:t>)</a:t>
+                        <a:t> (lower=0; upper=1)</a:t>
                       </a:r>
                     </a:p>
                     <a:p>
@@ -14828,15 +14825,7 @@
                     <a:p>
                       <a:r>
                         <a:rPr lang="en-IN" dirty="0" smtClean="0"/>
-                        <a:t>alpha=0.005,0.01,</a:t>
-                      </a:r>
-                      <a:r>
-                        <a:rPr lang="en-IN" b="1" dirty="0" smtClean="0"/>
-                        <a:t>0.02</a:t>
-                      </a:r>
-                      <a:r>
-                        <a:rPr lang="en-IN" dirty="0" smtClean="0"/>
-                        <a:t>,0.1</a:t>
+                        <a:t>beta=-0.001,-0.002,-0.003</a:t>
                       </a:r>
                       <a:endParaRPr lang="en-GB" dirty="0"/>
                     </a:p>
@@ -14878,11 +14867,7 @@
                       </a:r>
                       <a:r>
                         <a:rPr lang="en-IN" baseline="0" dirty="0" smtClean="0"/>
-                        <a:t>,20L,30L, </a:t>
-                      </a:r>
-                      <a:r>
-                        <a:rPr lang="en-IN" baseline="0" dirty="0" smtClean="0"/>
-                        <a:t>mu = </a:t>
+                        <a:t>,20L,30L, mu = </a:t>
                       </a:r>
                       <a:r>
                         <a:rPr lang="en-IN" b="1" baseline="0" dirty="0" smtClean="0"/>
@@ -14932,11 +14917,7 @@
                       </a:r>
                       <a:r>
                         <a:rPr lang="en-IN" dirty="0" smtClean="0"/>
-                        <a:t> </a:t>
-                      </a:r>
-                      <a:r>
-                        <a:rPr lang="en-IN" dirty="0" smtClean="0"/>
-                        <a:t>=10L,50L,100L,</a:t>
+                        <a:t> =10L,50L,100L,</a:t>
                       </a:r>
                       <a:r>
                         <a:rPr lang="en-IN" b="1" dirty="0" smtClean="0"/>
@@ -14960,8 +14941,8 @@
         </p:nvSpPr>
         <p:spPr>
           <a:xfrm>
-            <a:off x="2032000" y="5127285"/>
-            <a:ext cx="8704053" cy="2462213"/>
+            <a:off x="1962988" y="4385413"/>
+            <a:ext cx="8704053" cy="3293209"/>
           </a:xfrm>
           <a:prstGeom prst="rect">
             <a:avLst/>
@@ -15005,6 +14986,29 @@
               <a:rPr lang="en-GB" sz="1600" dirty="0" smtClean="0"/>
               <a:t>.</a:t>
             </a:r>
+          </a:p>
+          <a:p>
+            <a:r>
+              <a:rPr lang="en-GB" sz="1600" b="1" dirty="0" err="1"/>
+              <a:t>b</a:t>
+            </a:r>
+            <a:r>
+              <a:rPr lang="en-GB" sz="1600" b="1" dirty="0" err="1" smtClean="0"/>
+              <a:t>eta</a:t>
+            </a:r>
+            <a:r>
+              <a:rPr lang="en-GB" sz="1600" dirty="0" err="1" smtClean="0"/>
+              <a:t>:Parameter</a:t>
+            </a:r>
+            <a:r>
+              <a:rPr lang="en-GB" sz="1600" dirty="0" smtClean="0"/>
+              <a:t> </a:t>
+            </a:r>
+            <a:r>
+              <a:rPr lang="en-GB" sz="1600" dirty="0"/>
+              <a:t>of the sequential feature selection. Minimal required value of improvement difference for a backward / removing step. Negative values imply that you allow a slight decrease for the removal of a feature. Default is -0.001.</a:t>
+            </a:r>
+            <a:endParaRPr lang="en-GB" sz="1600" dirty="0" smtClean="0"/>
           </a:p>
           <a:p>
             <a:r>

</xml_diff>